<commit_message>
added class notes and hadoop slide
</commit_message>
<xml_diff>
--- a/Slides/Big Data Overview.pptx
+++ b/Slides/Big Data Overview.pptx
@@ -3122,7 +3122,7 @@
           <a:p>
             <a:fld id="{4C2A475F-9CDA-4DF8-B226-71823ECF3947}" type="datetimeFigureOut">
               <a:rPr lang="en-IN" smtClean="0"/>
-              <a:t>18-09-2022</a:t>
+              <a:t>21-09-2022</a:t>
             </a:fld>
             <a:endParaRPr lang="en-IN"/>
           </a:p>
@@ -3322,7 +3322,7 @@
           <a:p>
             <a:fld id="{4C2A475F-9CDA-4DF8-B226-71823ECF3947}" type="datetimeFigureOut">
               <a:rPr lang="en-IN" smtClean="0"/>
-              <a:t>18-09-2022</a:t>
+              <a:t>21-09-2022</a:t>
             </a:fld>
             <a:endParaRPr lang="en-IN"/>
           </a:p>
@@ -3532,7 +3532,7 @@
           <a:p>
             <a:fld id="{4C2A475F-9CDA-4DF8-B226-71823ECF3947}" type="datetimeFigureOut">
               <a:rPr lang="en-IN" smtClean="0"/>
-              <a:t>18-09-2022</a:t>
+              <a:t>21-09-2022</a:t>
             </a:fld>
             <a:endParaRPr lang="en-IN"/>
           </a:p>
@@ -3732,7 +3732,7 @@
           <a:p>
             <a:fld id="{4C2A475F-9CDA-4DF8-B226-71823ECF3947}" type="datetimeFigureOut">
               <a:rPr lang="en-IN" smtClean="0"/>
-              <a:t>18-09-2022</a:t>
+              <a:t>21-09-2022</a:t>
             </a:fld>
             <a:endParaRPr lang="en-IN"/>
           </a:p>
@@ -4008,7 +4008,7 @@
           <a:p>
             <a:fld id="{4C2A475F-9CDA-4DF8-B226-71823ECF3947}" type="datetimeFigureOut">
               <a:rPr lang="en-IN" smtClean="0"/>
-              <a:t>18-09-2022</a:t>
+              <a:t>21-09-2022</a:t>
             </a:fld>
             <a:endParaRPr lang="en-IN"/>
           </a:p>
@@ -4276,7 +4276,7 @@
           <a:p>
             <a:fld id="{4C2A475F-9CDA-4DF8-B226-71823ECF3947}" type="datetimeFigureOut">
               <a:rPr lang="en-IN" smtClean="0"/>
-              <a:t>18-09-2022</a:t>
+              <a:t>21-09-2022</a:t>
             </a:fld>
             <a:endParaRPr lang="en-IN"/>
           </a:p>
@@ -4691,7 +4691,7 @@
           <a:p>
             <a:fld id="{4C2A475F-9CDA-4DF8-B226-71823ECF3947}" type="datetimeFigureOut">
               <a:rPr lang="en-IN" smtClean="0"/>
-              <a:t>18-09-2022</a:t>
+              <a:t>21-09-2022</a:t>
             </a:fld>
             <a:endParaRPr lang="en-IN"/>
           </a:p>
@@ -4833,7 +4833,7 @@
           <a:p>
             <a:fld id="{4C2A475F-9CDA-4DF8-B226-71823ECF3947}" type="datetimeFigureOut">
               <a:rPr lang="en-IN" smtClean="0"/>
-              <a:t>18-09-2022</a:t>
+              <a:t>21-09-2022</a:t>
             </a:fld>
             <a:endParaRPr lang="en-IN"/>
           </a:p>
@@ -4946,7 +4946,7 @@
           <a:p>
             <a:fld id="{4C2A475F-9CDA-4DF8-B226-71823ECF3947}" type="datetimeFigureOut">
               <a:rPr lang="en-IN" smtClean="0"/>
-              <a:t>18-09-2022</a:t>
+              <a:t>21-09-2022</a:t>
             </a:fld>
             <a:endParaRPr lang="en-IN"/>
           </a:p>
@@ -5259,7 +5259,7 @@
           <a:p>
             <a:fld id="{4C2A475F-9CDA-4DF8-B226-71823ECF3947}" type="datetimeFigureOut">
               <a:rPr lang="en-IN" smtClean="0"/>
-              <a:t>18-09-2022</a:t>
+              <a:t>21-09-2022</a:t>
             </a:fld>
             <a:endParaRPr lang="en-IN"/>
           </a:p>
@@ -5548,7 +5548,7 @@
           <a:p>
             <a:fld id="{4C2A475F-9CDA-4DF8-B226-71823ECF3947}" type="datetimeFigureOut">
               <a:rPr lang="en-IN" smtClean="0"/>
-              <a:t>18-09-2022</a:t>
+              <a:t>21-09-2022</a:t>
             </a:fld>
             <a:endParaRPr lang="en-IN"/>
           </a:p>
@@ -5791,7 +5791,7 @@
           <a:p>
             <a:fld id="{4C2A475F-9CDA-4DF8-B226-71823ECF3947}" type="datetimeFigureOut">
               <a:rPr lang="en-IN" smtClean="0"/>
-              <a:t>18-09-2022</a:t>
+              <a:t>21-09-2022</a:t>
             </a:fld>
             <a:endParaRPr lang="en-IN"/>
           </a:p>

</xml_diff>